<commit_message>
Latest as of 3:50pm
</commit_message>
<xml_diff>
--- a/CS524_FinalProject_2-2.pptx
+++ b/CS524_FinalProject_2-2.pptx
@@ -132,7 +132,8 @@
 <file path=ppt/revisionInfo.xml><?xml version="1.0" encoding="utf-8"?>
 <p1510:revInfo xmlns:a="http://schemas.openxmlformats.org/drawingml/2006/main" xmlns:r="http://schemas.openxmlformats.org/officeDocument/2006/relationships" xmlns:p1510="http://schemas.microsoft.com/office/powerpoint/2015/10/main">
   <p1510:revLst>
-    <p1510:client id="{C21A4EDA-EC57-D07F-2ABA-36AF58E1071F}" v="368" dt="2023-12-04T18:06:38.539"/>
+    <p1510:client id="{A7CECEA5-3EBC-644D-C83D-DCFEB71D5FD5}" v="136" dt="2023-12-04T19:22:30.466"/>
+    <p1510:client id="{C21A4EDA-EC57-D07F-2ABA-36AF58E1071F}" v="369" dt="2023-12-04T18:09:05.998"/>
   </p1510:revLst>
 </p1510:revInfo>
 </file>
@@ -5190,17 +5191,13 @@
             </a:r>
           </a:p>
           <a:p>
-            <a:pPr indent="0">
-              <a:buFont typeface="Wingdings" panose="05000000000000000000"/>
-              <a:buNone/>
-            </a:pPr>
             <a:r>
               <a:rPr lang="en-US" sz="2000" dirty="0">
                 <a:latin typeface="Times New Roman" panose="02020503050405090304"/>
                 <a:cs typeface="Times New Roman" panose="02020503050405090304"/>
                 <a:sym typeface="+mn-ea"/>
               </a:rPr>
-              <a:t> (maximum depth = 10)</a:t>
+              <a:t> (maximum depth = 10)</a:t>
             </a:r>
             <a:endParaRPr lang="en-US" sz="2000" dirty="0">
               <a:latin typeface="Times New Roman" panose="02020503050405090304" pitchFamily="18" charset="0"/>
@@ -5297,35 +5294,6 @@
           </a:p>
         </p:txBody>
       </p:sp>
-      <p:pic>
-        <p:nvPicPr>
-          <p:cNvPr id="16" name="Picture 15" descr="A graph of trees and numbers&#10;&#10;Description automatically generated"/>
-          <p:cNvPicPr>
-            <a:picLocks noChangeAspect="1"/>
-          </p:cNvPicPr>
-          <p:nvPr/>
-        </p:nvPicPr>
-        <p:blipFill>
-          <a:blip r:embed="rId3"/>
-          <a:stretch>
-            <a:fillRect/>
-          </a:stretch>
-        </p:blipFill>
-        <p:spPr>
-          <a:xfrm>
-            <a:off x="3810580" y="4229873"/>
-            <a:ext cx="3084195" cy="2119630"/>
-          </a:xfrm>
-          <a:prstGeom prst="rect">
-            <a:avLst/>
-          </a:prstGeom>
-          <a:ln>
-            <a:solidFill>
-              <a:schemeClr val="bg1"/>
-            </a:solidFill>
-          </a:ln>
-        </p:spPr>
-      </p:pic>
       <p:sp>
         <p:nvSpPr>
           <p:cNvPr id="18" name="TextBox 10"/>
@@ -5335,7 +5303,7 @@
         <p:spPr>
           <a:xfrm>
             <a:off x="6863080" y="3950335"/>
-            <a:ext cx="4939030" cy="2585323"/>
+            <a:ext cx="4939030" cy="2031325"/>
           </a:xfrm>
           <a:prstGeom prst="rect">
             <a:avLst/>
@@ -5412,7 +5380,7 @@
                 <a:cs typeface="Times New Roman" panose="02020503050405090304"/>
                 <a:sym typeface="+mn-ea"/>
               </a:rPr>
-              <a:t>Drop bottom 50%, or kept top 50% of minority class</a:t>
+              <a:t>Kept top 50% of minority class</a:t>
             </a:r>
             <a:endParaRPr lang="en-US" dirty="0">
               <a:latin typeface="Times New Roman" panose="02020503050405090304"/>
@@ -5432,7 +5400,7 @@
                 <a:cs typeface="Times New Roman" panose="02020503050405090304"/>
                 <a:sym typeface="+mn-ea"/>
               </a:rPr>
-              <a:t>Drop bottom 50%, or kept top 50% of majority class</a:t>
+              <a:t>Kept top 50% of majority class</a:t>
             </a:r>
             <a:endParaRPr lang="en-US" dirty="0">
               <a:sym typeface="+mn-ea"/>
@@ -5475,7 +5443,7 @@
           <p:nvPr/>
         </p:nvPicPr>
         <p:blipFill>
-          <a:blip r:embed="rId4"/>
+          <a:blip r:embed="rId3"/>
           <a:stretch>
             <a:fillRect/>
           </a:stretch>
@@ -5510,7 +5478,7 @@
           <p:nvPr/>
         </p:nvPicPr>
         <p:blipFill>
-          <a:blip r:embed="rId5"/>
+          <a:blip r:embed="rId4"/>
           <a:stretch>
             <a:fillRect/>
           </a:stretch>
@@ -5518,7 +5486,7 @@
         <p:spPr>
           <a:xfrm>
             <a:off x="6962637" y="1783659"/>
-            <a:ext cx="4152901" cy="2109029"/>
+            <a:ext cx="3909945" cy="1987551"/>
           </a:xfrm>
           <a:prstGeom prst="rect">
             <a:avLst/>
@@ -5547,7 +5515,7 @@
           <p:nvPr/>
         </p:nvPicPr>
         <p:blipFill>
-          <a:blip r:embed="rId6"/>
+          <a:blip r:embed="rId5"/>
           <a:stretch>
             <a:fillRect/>
           </a:stretch>
@@ -5577,7 +5545,7 @@
           <p:nvPr/>
         </p:nvPicPr>
         <p:blipFill>
-          <a:blip r:embed="rId7"/>
+          <a:blip r:embed="rId6"/>
           <a:stretch>
             <a:fillRect/>
           </a:stretch>
@@ -5586,6 +5554,36 @@
           <a:xfrm>
             <a:off x="849795" y="2027927"/>
             <a:ext cx="3082236" cy="2139537"/>
+          </a:xfrm>
+          <a:prstGeom prst="rect">
+            <a:avLst/>
+          </a:prstGeom>
+        </p:spPr>
+      </p:pic>
+      <p:pic>
+        <p:nvPicPr>
+          <p:cNvPr id="2" name="Picture 1" descr="A graph of trees and numbers&#10;&#10;Description automatically generated">
+            <a:extLst>
+              <a:ext uri="{FF2B5EF4-FFF2-40B4-BE49-F238E27FC236}">
+                <a16:creationId xmlns:a16="http://schemas.microsoft.com/office/drawing/2014/main" id="{4933FC9B-1171-8EBD-1A43-0877DE31E61C}"/>
+              </a:ext>
+            </a:extLst>
+          </p:cNvPr>
+          <p:cNvPicPr>
+            <a:picLocks noChangeAspect="1"/>
+          </p:cNvPicPr>
+          <p:nvPr/>
+        </p:nvPicPr>
+        <p:blipFill>
+          <a:blip r:embed="rId7"/>
+          <a:stretch>
+            <a:fillRect/>
+          </a:stretch>
+        </p:blipFill>
+        <p:spPr>
+          <a:xfrm>
+            <a:off x="3804893" y="4160839"/>
+            <a:ext cx="2892564" cy="2136499"/>
           </a:xfrm>
           <a:prstGeom prst="rect">
             <a:avLst/>
@@ -7462,7 +7460,7 @@
         <p:spPr>
           <a:xfrm>
             <a:off x="5157470" y="3721735"/>
-            <a:ext cx="6108700" cy="2246769"/>
+            <a:ext cx="6108700" cy="2554545"/>
           </a:xfrm>
           <a:prstGeom prst="rect">
             <a:avLst/>
@@ -7539,6 +7537,19 @@
             </a:r>
           </a:p>
           <a:p>
+            <a:pPr marL="342900" indent="-342900">
+              <a:buFont typeface="Wingdings" panose="02070409020205090404"/>
+              <a:buChar char=""/>
+            </a:pPr>
+            <a:r>
+              <a:rPr lang="en-US" sz="2000" b="1" dirty="0">
+                <a:latin typeface="Times New Roman" panose="02020503050405090304"/>
+                <a:cs typeface="Times New Roman" panose="02020503050405090304"/>
+              </a:rPr>
+              <a:t>Challenges</a:t>
+            </a:r>
+          </a:p>
+          <a:p>
             <a:pPr marL="800100" lvl="1" indent="-342900">
               <a:buFont typeface="Courier New" panose="02070409020205090404"/>
               <a:buChar char="o"/>
@@ -7548,7 +7559,7 @@
                 <a:latin typeface="Times New Roman"/>
                 <a:cs typeface="Times New Roman"/>
               </a:rPr>
-              <a:t>Relevant feature selection is important</a:t>
+              <a:t>Feature Selection: Quantity and Quality </a:t>
             </a:r>
             <a:endParaRPr lang="en-US" sz="2000" dirty="0">
               <a:latin typeface="Times New Roman" panose="02020503050405090304" pitchFamily="18" charset="0"/>
@@ -12147,7 +12158,7 @@
         <p:spPr>
           <a:xfrm>
             <a:off x="846325" y="1313898"/>
-            <a:ext cx="10420159" cy="4246245"/>
+            <a:ext cx="10420159" cy="3970318"/>
           </a:xfrm>
           <a:prstGeom prst="rect">
             <a:avLst/>
@@ -12165,7 +12176,7 @@
               <a:buChar char="Ø"/>
             </a:pPr>
             <a:r>
-              <a:rPr lang="en-US" b="1">
+              <a:rPr lang="en-US" b="1" dirty="0">
                 <a:latin typeface="Times New Roman" panose="02020503050405090304"/>
                 <a:cs typeface="Times New Roman" panose="02020503050405090304"/>
               </a:rPr>
@@ -12178,7 +12189,7 @@
               <a:buChar char="o"/>
             </a:pPr>
             <a:r>
-              <a:rPr lang="en-US">
+              <a:rPr lang="en-US" dirty="0">
                 <a:latin typeface="Times New Roman" panose="02020503050405090304"/>
                 <a:cs typeface="Times New Roman" panose="02020503050405090304"/>
               </a:rPr>
@@ -12191,7 +12202,7 @@
               <a:buChar char="o"/>
             </a:pPr>
             <a:r>
-              <a:rPr lang="en-US">
+              <a:rPr lang="en-US" dirty="0">
                 <a:latin typeface="Times New Roman" panose="02020503050405090304"/>
                 <a:cs typeface="Times New Roman" panose="02020503050405090304"/>
               </a:rPr>
@@ -12204,7 +12215,7 @@
               <a:buChar char="o"/>
             </a:pPr>
             <a:r>
-              <a:rPr lang="en-US">
+              <a:rPr lang="en-US" dirty="0">
                 <a:latin typeface="Times New Roman" panose="02020503050405090304"/>
                 <a:cs typeface="Times New Roman" panose="02020503050405090304"/>
               </a:rPr>
@@ -12227,7 +12238,7 @@
               <a:buChar char="Ø"/>
             </a:pPr>
             <a:r>
-              <a:rPr lang="en-US" b="1">
+              <a:rPr lang="en-US" b="1" dirty="0">
                 <a:latin typeface="Times New Roman" panose="02020503050405090304"/>
                 <a:cs typeface="Times New Roman" panose="02020503050405090304"/>
               </a:rPr>
@@ -12240,7 +12251,7 @@
               <a:buChar char="o"/>
             </a:pPr>
             <a:r>
-              <a:rPr lang="en-US">
+              <a:rPr lang="en-US" dirty="0">
                 <a:latin typeface="Times New Roman" panose="02020503050405090304"/>
                 <a:cs typeface="Times New Roman" panose="02020503050405090304"/>
               </a:rPr>
@@ -12253,7 +12264,7 @@
               <a:buChar char="o"/>
             </a:pPr>
             <a:r>
-              <a:rPr lang="en-US">
+              <a:rPr lang="en-US" dirty="0">
                 <a:latin typeface="Times New Roman" panose="02020503050405090304"/>
                 <a:cs typeface="Times New Roman" panose="02020503050405090304"/>
               </a:rPr>
@@ -12266,26 +12277,13 @@
               <a:buChar char="o"/>
             </a:pPr>
             <a:r>
-              <a:rPr lang="en-US">
+              <a:rPr lang="en-US" dirty="0">
                 <a:latin typeface="Times New Roman" panose="02020503050405090304"/>
                 <a:cs typeface="Times New Roman" panose="02020503050405090304"/>
               </a:rPr>
               <a:t>Strengthen the observed characteristic for each class</a:t>
             </a:r>
-            <a:endParaRPr lang="en-US" sz="1600"/>
-          </a:p>
-          <a:p>
-            <a:pPr marL="800100" lvl="1" indent="-342900">
-              <a:buFont typeface="Courier New" panose="02070409020205090404"/>
-              <a:buChar char="o"/>
-            </a:pPr>
-            <a:r>
-              <a:rPr lang="en-US">
-                <a:latin typeface="Times New Roman" panose="02020503050405090304"/>
-                <a:cs typeface="Times New Roman" panose="02020503050405090304"/>
-              </a:rPr>
-              <a:t>Randomly shuffle training data</a:t>
-            </a:r>
+            <a:endParaRPr lang="en-US" sz="1600" dirty="0"/>
           </a:p>
           <a:p>
             <a:pPr marL="800100" lvl="1" indent="-342900">
@@ -12303,7 +12301,7 @@
               <a:buChar char="Ø"/>
             </a:pPr>
             <a:r>
-              <a:rPr lang="en-US" b="1">
+              <a:rPr lang="en-US" b="1" dirty="0">
                 <a:latin typeface="Times New Roman" panose="02020503050405090304"/>
                 <a:cs typeface="Times New Roman" panose="02020503050405090304"/>
               </a:rPr>
@@ -12326,7 +12324,7 @@
               <a:buChar char="Ø"/>
             </a:pPr>
             <a:r>
-              <a:rPr lang="en-US" b="1">
+              <a:rPr lang="en-US" b="1" dirty="0">
                 <a:latin typeface="Times New Roman" panose="02020503050405090304"/>
                 <a:cs typeface="Times New Roman" panose="02020503050405090304"/>
               </a:rPr>
@@ -12481,7 +12479,7 @@
         <p:spPr>
           <a:xfrm>
             <a:off x="6863080" y="3950335"/>
-            <a:ext cx="4939030" cy="2306955"/>
+            <a:ext cx="4939030" cy="1754326"/>
           </a:xfrm>
           <a:prstGeom prst="rect">
             <a:avLst/>
@@ -12554,7 +12552,7 @@
                 <a:ea typeface="Calibri"/>
                 <a:cs typeface="Times New Roman" panose="02020503050405090304"/>
               </a:rPr>
-              <a:t>Drop bottom 20%, or kept top 80% of minority class</a:t>
+              <a:t>Kept top 80% of minority class</a:t>
             </a:r>
           </a:p>
           <a:p>
@@ -12568,7 +12566,7 @@
                 <a:ea typeface="Calibri"/>
                 <a:cs typeface="Times New Roman" panose="02020503050405090304"/>
               </a:rPr>
-              <a:t>Drop bottom 50%, or kept top 50% of majority class</a:t>
+              <a:t>Kept top 50% of majority class</a:t>
             </a:r>
           </a:p>
           <a:p>
@@ -12675,8 +12673,8 @@
         </p:blipFill>
         <p:spPr>
           <a:xfrm>
-            <a:off x="3734099" y="4026974"/>
-            <a:ext cx="3046068" cy="2133462"/>
+            <a:off x="3844534" y="4038017"/>
+            <a:ext cx="2935634" cy="2133462"/>
           </a:xfrm>
           <a:prstGeom prst="rect">
             <a:avLst/>

</xml_diff>